<commit_message>
Begin implementation of PrescribedLULCs autonomous process. APs.xml - Add <prescribed_LULCs> block. CW3M_McKenzie.envx - Add the PrescribedLULCs autonomous process. HBV.csv - Use full precision parameter values from PEST for Cascadia54. Add ScenarioData/Demo_Baseline/prescribedLULCs.csv. APs.cpp, .h - Add InitPrescribedLULCs(). Add logic to WW2100AP::InitRun() for interpreting the SCENARIO_NAME macro. Add logic to WW2100AP::LoadXml() to read the new <prescribed_LULCs> block. EconModels.cpp - Add InitPrescribedLULCs(). EnvDoc.cpp, EnvContext.h - Add new member pScenarioManager to EnvContext. EnvEngine.vcxproj - Retarget for Visual Studios v142.
</commit_message>
<xml_diff>
--- a/DataCW3M/SSantiam/SSantiam.pptx
+++ b/DataCW3M/SSantiam/SSantiam.pptx
@@ -3401,7 +3401,7 @@
         <p:spPr>
           <a:xfrm>
             <a:off x="4171950" y="1333500"/>
-            <a:ext cx="1362874" cy="369332"/>
+            <a:ext cx="1694888" cy="369332"/>
           </a:xfrm>
           <a:prstGeom prst="rect">
             <a:avLst/>
@@ -3416,7 +3416,7 @@
           <a:p>
             <a:r>
               <a:rPr lang="en-US" dirty="0"/>
-              <a:t>ThomasCr56</a:t>
+              <a:t>ThomasCreek56</a:t>
             </a:r>
           </a:p>
         </p:txBody>
@@ -3436,7 +3436,7 @@
         <p:spPr>
           <a:xfrm>
             <a:off x="7648575" y="2667000"/>
-            <a:ext cx="1431354" cy="369332"/>
+            <a:ext cx="1966949" cy="369332"/>
           </a:xfrm>
           <a:prstGeom prst="rect">
             <a:avLst/>
@@ -3451,7 +3451,7 @@
           <a:p>
             <a:r>
               <a:rPr lang="en-US" dirty="0"/>
-              <a:t>Quartzville53</a:t>
+              <a:t>QuartzvilleCreek53</a:t>
             </a:r>
           </a:p>
         </p:txBody>
@@ -3505,8 +3505,8 @@
         </p:nvSpPr>
         <p:spPr>
           <a:xfrm>
-            <a:off x="4321779" y="5339834"/>
-            <a:ext cx="1151405" cy="369332"/>
+            <a:off x="4138825" y="5381507"/>
+            <a:ext cx="1483419" cy="369332"/>
           </a:xfrm>
           <a:prstGeom prst="rect">
             <a:avLst/>
@@ -3521,7 +3521,7 @@
           <a:p>
             <a:r>
               <a:rPr lang="en-US" dirty="0"/>
-              <a:t>WileyCr55</a:t>
+              <a:t>WileyCreek55</a:t>
             </a:r>
           </a:p>
         </p:txBody>
@@ -3690,7 +3690,7 @@
         <p:spPr>
           <a:xfrm>
             <a:off x="7074948" y="1234321"/>
-            <a:ext cx="1317284" cy="369332"/>
+            <a:ext cx="1649298" cy="369332"/>
           </a:xfrm>
           <a:prstGeom prst="rect">
             <a:avLst/>
@@ -3705,7 +3705,7 @@
           <a:p>
             <a:r>
               <a:rPr lang="en-US" dirty="0"/>
-              <a:t>SchaferCr52</a:t>
+              <a:t>SchaferCreek52</a:t>
             </a:r>
           </a:p>
         </p:txBody>

</xml_diff>